<commit_message>
Changed holes to have same winding as outer wire, added test cases
</commit_message>
<xml_diff>
--- a/design/Classes.pptx
+++ b/design/Classes.pptx
@@ -270,7 +270,7 @@
           <a:p>
             <a:fld id="{58DB766F-877B-49D6-908F-5576C977CE2B}" type="datetimeFigureOut">
               <a:rPr lang="en-US" smtClean="0"/>
-              <a:t>6/28/2020</a:t>
+              <a:t>8/21/2020</a:t>
             </a:fld>
             <a:endParaRPr lang="en-US"/>
           </a:p>
@@ -468,7 +468,7 @@
           <a:p>
             <a:fld id="{58DB766F-877B-49D6-908F-5576C977CE2B}" type="datetimeFigureOut">
               <a:rPr lang="en-US" smtClean="0"/>
-              <a:t>6/28/2020</a:t>
+              <a:t>8/21/2020</a:t>
             </a:fld>
             <a:endParaRPr lang="en-US"/>
           </a:p>
@@ -676,7 +676,7 @@
           <a:p>
             <a:fld id="{58DB766F-877B-49D6-908F-5576C977CE2B}" type="datetimeFigureOut">
               <a:rPr lang="en-US" smtClean="0"/>
-              <a:t>6/28/2020</a:t>
+              <a:t>8/21/2020</a:t>
             </a:fld>
             <a:endParaRPr lang="en-US"/>
           </a:p>
@@ -874,7 +874,7 @@
           <a:p>
             <a:fld id="{58DB766F-877B-49D6-908F-5576C977CE2B}" type="datetimeFigureOut">
               <a:rPr lang="en-US" smtClean="0"/>
-              <a:t>6/28/2020</a:t>
+              <a:t>8/21/2020</a:t>
             </a:fld>
             <a:endParaRPr lang="en-US"/>
           </a:p>
@@ -1149,7 +1149,7 @@
           <a:p>
             <a:fld id="{58DB766F-877B-49D6-908F-5576C977CE2B}" type="datetimeFigureOut">
               <a:rPr lang="en-US" smtClean="0"/>
-              <a:t>6/28/2020</a:t>
+              <a:t>8/21/2020</a:t>
             </a:fld>
             <a:endParaRPr lang="en-US"/>
           </a:p>
@@ -1414,7 +1414,7 @@
           <a:p>
             <a:fld id="{58DB766F-877B-49D6-908F-5576C977CE2B}" type="datetimeFigureOut">
               <a:rPr lang="en-US" smtClean="0"/>
-              <a:t>6/28/2020</a:t>
+              <a:t>8/21/2020</a:t>
             </a:fld>
             <a:endParaRPr lang="en-US"/>
           </a:p>
@@ -1826,7 +1826,7 @@
           <a:p>
             <a:fld id="{58DB766F-877B-49D6-908F-5576C977CE2B}" type="datetimeFigureOut">
               <a:rPr lang="en-US" smtClean="0"/>
-              <a:t>6/28/2020</a:t>
+              <a:t>8/21/2020</a:t>
             </a:fld>
             <a:endParaRPr lang="en-US"/>
           </a:p>
@@ -1967,7 +1967,7 @@
           <a:p>
             <a:fld id="{58DB766F-877B-49D6-908F-5576C977CE2B}" type="datetimeFigureOut">
               <a:rPr lang="en-US" smtClean="0"/>
-              <a:t>6/28/2020</a:t>
+              <a:t>8/21/2020</a:t>
             </a:fld>
             <a:endParaRPr lang="en-US"/>
           </a:p>
@@ -2080,7 +2080,7 @@
           <a:p>
             <a:fld id="{58DB766F-877B-49D6-908F-5576C977CE2B}" type="datetimeFigureOut">
               <a:rPr lang="en-US" smtClean="0"/>
-              <a:t>6/28/2020</a:t>
+              <a:t>8/21/2020</a:t>
             </a:fld>
             <a:endParaRPr lang="en-US"/>
           </a:p>
@@ -2391,7 +2391,7 @@
           <a:p>
             <a:fld id="{58DB766F-877B-49D6-908F-5576C977CE2B}" type="datetimeFigureOut">
               <a:rPr lang="en-US" smtClean="0"/>
-              <a:t>6/28/2020</a:t>
+              <a:t>8/21/2020</a:t>
             </a:fld>
             <a:endParaRPr lang="en-US"/>
           </a:p>
@@ -2679,7 +2679,7 @@
           <a:p>
             <a:fld id="{58DB766F-877B-49D6-908F-5576C977CE2B}" type="datetimeFigureOut">
               <a:rPr lang="en-US" smtClean="0"/>
-              <a:t>6/28/2020</a:t>
+              <a:t>8/21/2020</a:t>
             </a:fld>
             <a:endParaRPr lang="en-US"/>
           </a:p>
@@ -2920,7 +2920,7 @@
           <a:p>
             <a:fld id="{58DB766F-877B-49D6-908F-5576C977CE2B}" type="datetimeFigureOut">
               <a:rPr lang="en-US" smtClean="0"/>
-              <a:t>6/28/2020</a:t>
+              <a:t>8/21/2020</a:t>
             </a:fld>
             <a:endParaRPr lang="en-US"/>
           </a:p>
@@ -4295,8 +4295,8 @@
             <a:avLst/>
           </a:prstGeom>
           <a:ln w="50800">
-            <a:headEnd type="triangle"/>
-            <a:tailEnd type="none"/>
+            <a:headEnd type="none"/>
+            <a:tailEnd type="triangle"/>
           </a:ln>
         </p:spPr>
         <p:style>
@@ -4438,8 +4438,8 @@
             <a:avLst/>
           </a:prstGeom>
           <a:ln w="50800">
-            <a:headEnd type="none"/>
-            <a:tailEnd type="triangle"/>
+            <a:headEnd type="triangle"/>
+            <a:tailEnd type="none"/>
           </a:ln>
         </p:spPr>
         <p:style>
@@ -4581,8 +4581,8 @@
             <a:avLst/>
           </a:prstGeom>
           <a:ln w="50800">
-            <a:headEnd type="triangle"/>
-            <a:tailEnd type="none"/>
+            <a:headEnd type="none"/>
+            <a:tailEnd type="triangle"/>
           </a:ln>
         </p:spPr>
         <p:style>
@@ -4625,8 +4625,8 @@
             <a:avLst/>
           </a:prstGeom>
           <a:ln w="50800">
-            <a:headEnd type="none"/>
-            <a:tailEnd type="triangle"/>
+            <a:headEnd type="triangle"/>
+            <a:tailEnd type="none"/>
           </a:ln>
         </p:spPr>
         <p:style>
@@ -5024,8 +5024,8 @@
             <a:avLst/>
           </a:prstGeom>
           <a:ln w="50800">
-            <a:headEnd type="triangle"/>
-            <a:tailEnd type="none"/>
+            <a:headEnd type="none"/>
+            <a:tailEnd type="triangle"/>
           </a:ln>
         </p:spPr>
         <p:style>
@@ -5167,8 +5167,8 @@
             <a:avLst/>
           </a:prstGeom>
           <a:ln w="50800">
-            <a:headEnd type="none"/>
-            <a:tailEnd type="triangle"/>
+            <a:headEnd type="triangle"/>
+            <a:tailEnd type="none"/>
           </a:ln>
         </p:spPr>
         <p:style>
@@ -5310,8 +5310,8 @@
             <a:avLst/>
           </a:prstGeom>
           <a:ln w="50800">
-            <a:headEnd type="triangle"/>
-            <a:tailEnd type="none"/>
+            <a:headEnd type="none"/>
+            <a:tailEnd type="triangle"/>
           </a:ln>
         </p:spPr>
         <p:style>
@@ -6296,6 +6296,48 @@
           </a:p>
         </p:txBody>
       </p:sp>
+      <p:cxnSp>
+        <p:nvCxnSpPr>
+          <p:cNvPr id="66" name="Straight Arrow Connector 65">
+            <a:extLst>
+              <a:ext uri="{FF2B5EF4-FFF2-40B4-BE49-F238E27FC236}">
+                <a16:creationId xmlns:a16="http://schemas.microsoft.com/office/drawing/2014/main" id="{B5DE13F8-FD7C-4D00-B283-BED9E4441930}"/>
+              </a:ext>
+            </a:extLst>
+          </p:cNvPr>
+          <p:cNvCxnSpPr>
+            <a:cxnSpLocks/>
+          </p:cNvCxnSpPr>
+          <p:nvPr/>
+        </p:nvCxnSpPr>
+        <p:spPr>
+          <a:xfrm flipH="1">
+            <a:off x="7703578" y="5805077"/>
+            <a:ext cx="1062252" cy="9716"/>
+          </a:xfrm>
+          <a:prstGeom prst="straightConnector1">
+            <a:avLst/>
+          </a:prstGeom>
+          <a:ln w="50800">
+            <a:headEnd type="triangle"/>
+            <a:tailEnd type="none"/>
+          </a:ln>
+        </p:spPr>
+        <p:style>
+          <a:lnRef idx="1">
+            <a:schemeClr val="accent1"/>
+          </a:lnRef>
+          <a:fillRef idx="0">
+            <a:schemeClr val="accent1"/>
+          </a:fillRef>
+          <a:effectRef idx="0">
+            <a:schemeClr val="accent1"/>
+          </a:effectRef>
+          <a:fontRef idx="minor">
+            <a:schemeClr val="tx1"/>
+          </a:fontRef>
+        </p:style>
+      </p:cxnSp>
     </p:spTree>
     <p:extLst>
       <p:ext uri="{BB962C8B-B14F-4D97-AF65-F5344CB8AC3E}">
@@ -6368,8 +6410,8 @@
         </p:nvSpPr>
         <p:spPr>
           <a:xfrm>
-            <a:off x="3370800" y="3181682"/>
-            <a:ext cx="4879477" cy="646331"/>
+            <a:off x="2673043" y="3105834"/>
+            <a:ext cx="6845913" cy="646331"/>
           </a:xfrm>
           <a:prstGeom prst="rect">
             <a:avLst/>
@@ -6384,15 +6426,7 @@
           <a:p>
             <a:r>
               <a:rPr lang="en-US" sz="3600" dirty="0"/>
-              <a:t>Shell, Cell, </a:t>
-            </a:r>
-            <a:r>
-              <a:rPr lang="en-US" sz="3600" dirty="0" err="1"/>
-              <a:t>etc</a:t>
-            </a:r>
-            <a:r>
-              <a:rPr lang="en-US" sz="3600" dirty="0"/>
-              <a:t> come later</a:t>
+              <a:t>Shell, Cell, Cell Complex come later</a:t>
             </a:r>
           </a:p>
         </p:txBody>
@@ -15308,8 +15342,8 @@
             <a:avLst/>
           </a:prstGeom>
           <a:ln w="50800">
-            <a:headEnd type="none"/>
-            <a:tailEnd type="triangle"/>
+            <a:headEnd type="triangle"/>
+            <a:tailEnd type="none"/>
           </a:ln>
         </p:spPr>
         <p:style>
@@ -15451,8 +15485,8 @@
             <a:avLst/>
           </a:prstGeom>
           <a:ln w="50800">
-            <a:headEnd type="triangle"/>
-            <a:tailEnd type="none"/>
+            <a:headEnd type="none"/>
+            <a:tailEnd type="triangle"/>
           </a:ln>
         </p:spPr>
         <p:style>
@@ -15594,8 +15628,8 @@
             <a:avLst/>
           </a:prstGeom>
           <a:ln w="50800">
-            <a:headEnd type="none"/>
-            <a:tailEnd type="triangle"/>
+            <a:headEnd type="triangle"/>
+            <a:tailEnd type="none"/>
           </a:ln>
         </p:spPr>
         <p:style>
@@ -15638,8 +15672,8 @@
             <a:avLst/>
           </a:prstGeom>
           <a:ln w="50800">
-            <a:headEnd type="triangle"/>
-            <a:tailEnd type="none"/>
+            <a:headEnd type="none"/>
+            <a:tailEnd type="triangle"/>
           </a:ln>
         </p:spPr>
         <p:style>
@@ -16037,8 +16071,8 @@
             <a:avLst/>
           </a:prstGeom>
           <a:ln w="50800">
-            <a:headEnd type="none"/>
-            <a:tailEnd type="triangle"/>
+            <a:headEnd type="triangle"/>
+            <a:tailEnd type="none"/>
           </a:ln>
         </p:spPr>
         <p:style>
@@ -16180,8 +16214,8 @@
             <a:avLst/>
           </a:prstGeom>
           <a:ln w="50800">
-            <a:headEnd type="triangle"/>
-            <a:tailEnd type="none"/>
+            <a:headEnd type="none"/>
+            <a:tailEnd type="triangle"/>
           </a:ln>
         </p:spPr>
         <p:style>
@@ -16323,8 +16357,8 @@
             <a:avLst/>
           </a:prstGeom>
           <a:ln w="50800">
-            <a:headEnd type="none"/>
-            <a:tailEnd type="triangle"/>
+            <a:headEnd type="triangle"/>
+            <a:tailEnd type="none"/>
           </a:ln>
         </p:spPr>
         <p:style>
@@ -17288,8 +17322,8 @@
         </p:nvSpPr>
         <p:spPr>
           <a:xfrm>
-            <a:off x="3038533" y="137038"/>
-            <a:ext cx="9048183" cy="646331"/>
+            <a:off x="3968624" y="187130"/>
+            <a:ext cx="7907999" cy="646331"/>
           </a:xfrm>
           <a:prstGeom prst="rect">
             <a:avLst/>
@@ -17304,11 +17338,53 @@
           <a:p>
             <a:r>
               <a:rPr lang="en-US" sz="3600" dirty="0"/>
-              <a:t>Holes always have opposite winding from outer</a:t>
+              <a:t>Holes always have same winding as outer</a:t>
             </a:r>
           </a:p>
         </p:txBody>
       </p:sp>
+      <p:cxnSp>
+        <p:nvCxnSpPr>
+          <p:cNvPr id="66" name="Straight Arrow Connector 65">
+            <a:extLst>
+              <a:ext uri="{FF2B5EF4-FFF2-40B4-BE49-F238E27FC236}">
+                <a16:creationId xmlns:a16="http://schemas.microsoft.com/office/drawing/2014/main" id="{14650646-6545-46C0-868E-8F585309495F}"/>
+              </a:ext>
+            </a:extLst>
+          </p:cNvPr>
+          <p:cNvCxnSpPr>
+            <a:cxnSpLocks/>
+          </p:cNvCxnSpPr>
+          <p:nvPr/>
+        </p:nvCxnSpPr>
+        <p:spPr>
+          <a:xfrm flipH="1">
+            <a:off x="7681270" y="5809595"/>
+            <a:ext cx="1062252" cy="9716"/>
+          </a:xfrm>
+          <a:prstGeom prst="straightConnector1">
+            <a:avLst/>
+          </a:prstGeom>
+          <a:ln w="50800">
+            <a:headEnd type="none"/>
+            <a:tailEnd type="triangle"/>
+          </a:ln>
+        </p:spPr>
+        <p:style>
+          <a:lnRef idx="1">
+            <a:schemeClr val="accent1"/>
+          </a:lnRef>
+          <a:fillRef idx="0">
+            <a:schemeClr val="accent1"/>
+          </a:fillRef>
+          <a:effectRef idx="0">
+            <a:schemeClr val="accent1"/>
+          </a:effectRef>
+          <a:fontRef idx="minor">
+            <a:schemeClr val="tx1"/>
+          </a:fontRef>
+        </p:style>
+      </p:cxnSp>
     </p:spTree>
     <p:extLst>
       <p:ext uri="{BB962C8B-B14F-4D97-AF65-F5344CB8AC3E}">

</xml_diff>